<commit_message>
corrección del puto juanlu
</commit_message>
<xml_diff>
--- a/case.pptx
+++ b/case.pptx
@@ -8608,8 +8608,8 @@
         </p:nvSpPr>
         <p:spPr>
           <a:xfrm>
-            <a:off x="1143001" y="1203678"/>
-            <a:ext cx="4312582" cy="2028707"/>
+            <a:off x="982133" y="1203678"/>
+            <a:ext cx="4473450" cy="2028707"/>
           </a:xfrm>
         </p:spPr>
         <p:txBody>
@@ -8653,52 +8653,52 @@
         </p:spPr>
         <p:txBody>
           <a:bodyPr anchor="b">
-            <a:normAutofit fontScale="85000" lnSpcReduction="10000"/>
+            <a:normAutofit/>
           </a:bodyPr>
           <a:lstStyle/>
           <a:p>
-            <a:pPr indent="-227965" algn="ctr">
+            <a:pPr algn="l"/>
+            <a:endParaRPr lang="es-ES" b="1" i="0" dirty="0">
+              <a:effectLst/>
+              <a:latin typeface="Arial" panose="020B0604020202020204" pitchFamily="34" charset="0"/>
+              <a:ea typeface="+mn-lt"/>
+              <a:cs typeface="+mn-lt"/>
+            </a:endParaRPr>
+          </a:p>
+          <a:p>
+            <a:pPr algn="l"/>
+            <a:r>
+              <a:rPr lang="es-ES" b="1" i="0" dirty="0">
+                <a:effectLst/>
+              </a:rPr>
+              <a:t>Herramientas de control de cambio. </a:t>
+            </a:r>
+            <a:r>
+              <a:rPr lang="es-ES" b="0" i="0" dirty="0">
+                <a:effectLst/>
+              </a:rPr>
+              <a:t>Se ocupan de los cambios hechos en el software después de que se haya fijado su línea de base, o cuando el software se lanza por primera vez al mercado.</a:t>
+            </a:r>
+          </a:p>
+          <a:p>
+            <a:pPr algn="ctr">
               <a:spcBef>
-                <a:spcPts val="1001"/>
+                <a:spcPts val="499"/>
               </a:spcBef>
-              <a:buFont typeface="Arial,Sans-Serif" panose="020B0604020202020204" pitchFamily="34" charset="0"/>
             </a:pPr>
             <a:r>
               <a:rPr lang="es-ES" b="1" dirty="0">
                 <a:ea typeface="+mn-lt"/>
                 <a:cs typeface="+mn-lt"/>
               </a:rPr>
-              <a:t>Herramientas de diseño:</a:t>
+              <a:t>Herramientas de programación:</a:t>
             </a:r>
             <a:r>
               <a:rPr lang="es-ES" dirty="0">
                 <a:ea typeface="+mn-lt"/>
                 <a:cs typeface="+mn-lt"/>
               </a:rPr>
-              <a:t> Estas herramientas ayudan a los diseñadores de software a crear la estructura de los programas, la cual se puede más adelante desglosar en pequeños módulos usando técnicas de perfeccionamiento.</a:t>
-            </a:r>
-            <a:endParaRPr lang="es-ES" dirty="0"/>
-          </a:p>
-          <a:p>
-            <a:pPr indent="-227965" algn="ctr">
-              <a:spcBef>
-                <a:spcPts val="1001"/>
-              </a:spcBef>
-              <a:buFont typeface="Arial,Sans-Serif" panose="020B0604020202020204" pitchFamily="34" charset="0"/>
-            </a:pPr>
-            <a:r>
-              <a:rPr lang="es-ES" b="1" dirty="0">
-                <a:ea typeface="+mn-lt"/>
-                <a:cs typeface="+mn-lt"/>
-              </a:rPr>
-              <a:t>Herramientas para la gestión de la Configuración:</a:t>
-            </a:r>
-            <a:r>
-              <a:rPr lang="es-ES" dirty="0">
-                <a:ea typeface="+mn-lt"/>
-                <a:cs typeface="+mn-lt"/>
-              </a:rPr>
-              <a:t> Un ejemplo de software se lanza al mercado en una versión. Las Herramientas para la gestión de la Configuración se ocupa de ello:</a:t>
+              <a:t> Consisten en entornos de programación como IDE, basado en bibliotecas modulares y herramientas de simulaciones.</a:t>
             </a:r>
           </a:p>
           <a:p>
@@ -8708,50 +8708,6 @@
               </a:spcBef>
               <a:buNone/>
             </a:pPr>
-            <a:r>
-              <a:rPr lang="es-ES" i="1" dirty="0">
-                <a:ea typeface="+mn-lt"/>
-                <a:cs typeface="+mn-lt"/>
-              </a:rPr>
-              <a:t>    - </a:t>
-            </a:r>
-            <a:r>
-              <a:rPr lang="es-ES" dirty="0">
-                <a:ea typeface="+mn-lt"/>
-                <a:cs typeface="+mn-lt"/>
-              </a:rPr>
-              <a:t>Control de versiones</a:t>
-            </a:r>
-          </a:p>
-          <a:p>
-            <a:pPr marL="0" indent="0" algn="ctr">
-              <a:spcBef>
-                <a:spcPts val="499"/>
-              </a:spcBef>
-              <a:buNone/>
-            </a:pPr>
-            <a:r>
-              <a:rPr lang="es-ES" dirty="0">
-                <a:ea typeface="+mn-lt"/>
-                <a:cs typeface="+mn-lt"/>
-              </a:rPr>
-              <a:t>     - Línea base</a:t>
-            </a:r>
-          </a:p>
-          <a:p>
-            <a:pPr marL="0" indent="0" algn="ctr">
-              <a:spcBef>
-                <a:spcPts val="499"/>
-              </a:spcBef>
-              <a:buNone/>
-            </a:pPr>
-            <a:r>
-              <a:rPr lang="es-ES" dirty="0">
-                <a:ea typeface="+mn-lt"/>
-                <a:cs typeface="+mn-lt"/>
-              </a:rPr>
-              <a:t>     - Gestión del control de cambios</a:t>
-            </a:r>
             <a:endParaRPr lang="es-ES" dirty="0"/>
           </a:p>
         </p:txBody>

</xml_diff>